<commit_message>
esp32 code, updated website template
</commit_message>
<xml_diff>
--- a/Structure/website template.pptx
+++ b/Structure/website template.pptx
@@ -6,6 +6,8 @@
   </p:sldMasterIdLst>
   <p:sldIdLst>
     <p:sldId id="257" r:id="rId2"/>
+    <p:sldId id="258" r:id="rId3"/>
+    <p:sldId id="259" r:id="rId4"/>
   </p:sldIdLst>
   <p:sldSz cx="12192000" cy="6858000"/>
   <p:notesSz cx="6858000" cy="9144000"/>
@@ -259,7 +261,7 @@
           <a:p>
             <a:fld id="{72A28554-B4A5-4CA1-9813-86FC5337F85E}" type="datetimeFigureOut">
               <a:rPr lang="en-US" smtClean="0"/>
-              <a:t>7/29/2025</a:t>
+              <a:t>8/23/2025</a:t>
             </a:fld>
             <a:endParaRPr lang="en-US"/>
           </a:p>
@@ -457,7 +459,7 @@
           <a:p>
             <a:fld id="{72A28554-B4A5-4CA1-9813-86FC5337F85E}" type="datetimeFigureOut">
               <a:rPr lang="en-US" smtClean="0"/>
-              <a:t>7/29/2025</a:t>
+              <a:t>8/23/2025</a:t>
             </a:fld>
             <a:endParaRPr lang="en-US"/>
           </a:p>
@@ -665,7 +667,7 @@
           <a:p>
             <a:fld id="{72A28554-B4A5-4CA1-9813-86FC5337F85E}" type="datetimeFigureOut">
               <a:rPr lang="en-US" smtClean="0"/>
-              <a:t>7/29/2025</a:t>
+              <a:t>8/23/2025</a:t>
             </a:fld>
             <a:endParaRPr lang="en-US"/>
           </a:p>
@@ -863,7 +865,7 @@
           <a:p>
             <a:fld id="{72A28554-B4A5-4CA1-9813-86FC5337F85E}" type="datetimeFigureOut">
               <a:rPr lang="en-US" smtClean="0"/>
-              <a:t>7/29/2025</a:t>
+              <a:t>8/23/2025</a:t>
             </a:fld>
             <a:endParaRPr lang="en-US"/>
           </a:p>
@@ -1138,7 +1140,7 @@
           <a:p>
             <a:fld id="{72A28554-B4A5-4CA1-9813-86FC5337F85E}" type="datetimeFigureOut">
               <a:rPr lang="en-US" smtClean="0"/>
-              <a:t>7/29/2025</a:t>
+              <a:t>8/23/2025</a:t>
             </a:fld>
             <a:endParaRPr lang="en-US"/>
           </a:p>
@@ -1403,7 +1405,7 @@
           <a:p>
             <a:fld id="{72A28554-B4A5-4CA1-9813-86FC5337F85E}" type="datetimeFigureOut">
               <a:rPr lang="en-US" smtClean="0"/>
-              <a:t>7/29/2025</a:t>
+              <a:t>8/23/2025</a:t>
             </a:fld>
             <a:endParaRPr lang="en-US"/>
           </a:p>
@@ -1815,7 +1817,7 @@
           <a:p>
             <a:fld id="{72A28554-B4A5-4CA1-9813-86FC5337F85E}" type="datetimeFigureOut">
               <a:rPr lang="en-US" smtClean="0"/>
-              <a:t>7/29/2025</a:t>
+              <a:t>8/23/2025</a:t>
             </a:fld>
             <a:endParaRPr lang="en-US"/>
           </a:p>
@@ -1956,7 +1958,7 @@
           <a:p>
             <a:fld id="{72A28554-B4A5-4CA1-9813-86FC5337F85E}" type="datetimeFigureOut">
               <a:rPr lang="en-US" smtClean="0"/>
-              <a:t>7/29/2025</a:t>
+              <a:t>8/23/2025</a:t>
             </a:fld>
             <a:endParaRPr lang="en-US"/>
           </a:p>
@@ -2069,7 +2071,7 @@
           <a:p>
             <a:fld id="{72A28554-B4A5-4CA1-9813-86FC5337F85E}" type="datetimeFigureOut">
               <a:rPr lang="en-US" smtClean="0"/>
-              <a:t>7/29/2025</a:t>
+              <a:t>8/23/2025</a:t>
             </a:fld>
             <a:endParaRPr lang="en-US"/>
           </a:p>
@@ -2380,7 +2382,7 @@
           <a:p>
             <a:fld id="{72A28554-B4A5-4CA1-9813-86FC5337F85E}" type="datetimeFigureOut">
               <a:rPr lang="en-US" smtClean="0"/>
-              <a:t>7/29/2025</a:t>
+              <a:t>8/23/2025</a:t>
             </a:fld>
             <a:endParaRPr lang="en-US"/>
           </a:p>
@@ -2668,7 +2670,7 @@
           <a:p>
             <a:fld id="{72A28554-B4A5-4CA1-9813-86FC5337F85E}" type="datetimeFigureOut">
               <a:rPr lang="en-US" smtClean="0"/>
-              <a:t>7/29/2025</a:t>
+              <a:t>8/23/2025</a:t>
             </a:fld>
             <a:endParaRPr lang="en-US"/>
           </a:p>
@@ -2909,7 +2911,7 @@
           <a:p>
             <a:fld id="{72A28554-B4A5-4CA1-9813-86FC5337F85E}" type="datetimeFigureOut">
               <a:rPr lang="en-US" smtClean="0"/>
-              <a:t>7/29/2025</a:t>
+              <a:t>8/23/2025</a:t>
             </a:fld>
             <a:endParaRPr lang="en-US"/>
           </a:p>
@@ -4211,6 +4213,1470 @@
     <p:extLst>
       <p:ext uri="{BB962C8B-B14F-4D97-AF65-F5344CB8AC3E}">
         <p14:creationId xmlns:p14="http://schemas.microsoft.com/office/powerpoint/2010/main" val="742488756"/>
+      </p:ext>
+    </p:extLst>
+  </p:cSld>
+  <p:clrMapOvr>
+    <a:masterClrMapping/>
+  </p:clrMapOvr>
+</p:sld>
+</file>
+
+<file path=ppt/slides/slide2.xml><?xml version="1.0" encoding="utf-8"?>
+<p:sld xmlns:a="http://schemas.openxmlformats.org/drawingml/2006/main" xmlns:r="http://schemas.openxmlformats.org/officeDocument/2006/relationships" xmlns:p="http://schemas.openxmlformats.org/presentationml/2006/main">
+  <p:cSld>
+    <p:spTree>
+      <p:nvGrpSpPr>
+        <p:cNvPr id="1" name=""/>
+        <p:cNvGrpSpPr/>
+        <p:nvPr/>
+      </p:nvGrpSpPr>
+      <p:grpSpPr>
+        <a:xfrm>
+          <a:off x="0" y="0"/>
+          <a:ext cx="0" cy="0"/>
+          <a:chOff x="0" y="0"/>
+          <a:chExt cx="0" cy="0"/>
+        </a:xfrm>
+      </p:grpSpPr>
+      <p:pic>
+        <p:nvPicPr>
+          <p:cNvPr id="3" name="Picture 2">
+            <a:extLst>
+              <a:ext uri="{FF2B5EF4-FFF2-40B4-BE49-F238E27FC236}">
+                <a16:creationId xmlns:a16="http://schemas.microsoft.com/office/drawing/2014/main" id="{97A56E64-A382-204E-F7AD-E89A5CBD2797}"/>
+              </a:ext>
+            </a:extLst>
+          </p:cNvPr>
+          <p:cNvPicPr>
+            <a:picLocks noChangeAspect="1"/>
+          </p:cNvPicPr>
+          <p:nvPr/>
+        </p:nvPicPr>
+        <p:blipFill>
+          <a:blip r:embed="rId2"/>
+          <a:srcRect r="5025" b="4775"/>
+          <a:stretch>
+            <a:fillRect/>
+          </a:stretch>
+        </p:blipFill>
+        <p:spPr>
+          <a:xfrm>
+            <a:off x="0" y="0"/>
+            <a:ext cx="12186650" cy="6083929"/>
+          </a:xfrm>
+          <a:prstGeom prst="rect">
+            <a:avLst/>
+          </a:prstGeom>
+        </p:spPr>
+      </p:pic>
+      <p:sp>
+        <p:nvSpPr>
+          <p:cNvPr id="4" name="Rectangle: Rounded Corners 3">
+            <a:extLst>
+              <a:ext uri="{FF2B5EF4-FFF2-40B4-BE49-F238E27FC236}">
+                <a16:creationId xmlns:a16="http://schemas.microsoft.com/office/drawing/2014/main" id="{272EBEC6-BBA3-A441-74A2-42B0F2C2233B}"/>
+              </a:ext>
+            </a:extLst>
+          </p:cNvPr>
+          <p:cNvSpPr/>
+          <p:nvPr/>
+        </p:nvSpPr>
+        <p:spPr>
+          <a:xfrm>
+            <a:off x="0" y="1104523"/>
+            <a:ext cx="5106154" cy="3539905"/>
+          </a:xfrm>
+          <a:prstGeom prst="roundRect">
+            <a:avLst>
+              <a:gd name="adj" fmla="val 2601"/>
+            </a:avLst>
+          </a:prstGeom>
+          <a:solidFill>
+            <a:schemeClr val="bg1"/>
+          </a:solidFill>
+        </p:spPr>
+        <p:style>
+          <a:lnRef idx="2">
+            <a:schemeClr val="accent1">
+              <a:shade val="15000"/>
+            </a:schemeClr>
+          </a:lnRef>
+          <a:fillRef idx="1">
+            <a:schemeClr val="accent1"/>
+          </a:fillRef>
+          <a:effectRef idx="0">
+            <a:schemeClr val="accent1"/>
+          </a:effectRef>
+          <a:fontRef idx="minor">
+            <a:schemeClr val="lt1"/>
+          </a:fontRef>
+        </p:style>
+        <p:txBody>
+          <a:bodyPr rtlCol="0" anchor="ctr"/>
+          <a:lstStyle/>
+          <a:p>
+            <a:pPr algn="ctr"/>
+            <a:r>
+              <a:rPr lang="en-US" dirty="0"/>
+              <a:t>d</a:t>
+            </a:r>
+          </a:p>
+        </p:txBody>
+      </p:sp>
+      <p:pic>
+        <p:nvPicPr>
+          <p:cNvPr id="6" name="Picture 5" descr="A green battery with black background&#10;&#10;AI-generated content may be incorrect.">
+            <a:extLst>
+              <a:ext uri="{FF2B5EF4-FFF2-40B4-BE49-F238E27FC236}">
+                <a16:creationId xmlns:a16="http://schemas.microsoft.com/office/drawing/2014/main" id="{08E88218-8E04-4317-3B97-184E793006DA}"/>
+              </a:ext>
+            </a:extLst>
+          </p:cNvPr>
+          <p:cNvPicPr>
+            <a:picLocks noChangeAspect="1"/>
+          </p:cNvPicPr>
+          <p:nvPr/>
+        </p:nvPicPr>
+        <p:blipFill>
+          <a:blip r:embed="rId3">
+            <a:extLst>
+              <a:ext uri="{28A0092B-C50C-407E-A947-70E740481C1C}">
+                <a14:useLocalDpi xmlns:a14="http://schemas.microsoft.com/office/drawing/2010/main" val="0"/>
+              </a:ext>
+            </a:extLst>
+          </a:blip>
+          <a:stretch>
+            <a:fillRect/>
+          </a:stretch>
+        </p:blipFill>
+        <p:spPr>
+          <a:xfrm>
+            <a:off x="149777" y="3739231"/>
+            <a:ext cx="668825" cy="668825"/>
+          </a:xfrm>
+          <a:prstGeom prst="rect">
+            <a:avLst/>
+          </a:prstGeom>
+        </p:spPr>
+      </p:pic>
+      <p:pic>
+        <p:nvPicPr>
+          <p:cNvPr id="8" name="Picture 7" descr="A map with a pin on it&#10;&#10;AI-generated content may be incorrect.">
+            <a:extLst>
+              <a:ext uri="{FF2B5EF4-FFF2-40B4-BE49-F238E27FC236}">
+                <a16:creationId xmlns:a16="http://schemas.microsoft.com/office/drawing/2014/main" id="{21E530B5-C72A-FC33-A381-DE7257E29C24}"/>
+              </a:ext>
+            </a:extLst>
+          </p:cNvPr>
+          <p:cNvPicPr>
+            <a:picLocks noChangeAspect="1"/>
+          </p:cNvPicPr>
+          <p:nvPr/>
+        </p:nvPicPr>
+        <p:blipFill>
+          <a:blip r:embed="rId4">
+            <a:extLst>
+              <a:ext uri="{28A0092B-C50C-407E-A947-70E740481C1C}">
+                <a14:useLocalDpi xmlns:a14="http://schemas.microsoft.com/office/drawing/2010/main" val="0"/>
+              </a:ext>
+            </a:extLst>
+          </a:blip>
+          <a:stretch>
+            <a:fillRect/>
+          </a:stretch>
+        </p:blipFill>
+        <p:spPr>
+          <a:xfrm>
+            <a:off x="234517" y="2023875"/>
+            <a:ext cx="542358" cy="542358"/>
+          </a:xfrm>
+          <a:prstGeom prst="rect">
+            <a:avLst/>
+          </a:prstGeom>
+        </p:spPr>
+      </p:pic>
+      <p:pic>
+        <p:nvPicPr>
+          <p:cNvPr id="10" name="Picture 9" descr="A black background with a black square&#10;&#10;AI-generated content may be incorrect.">
+            <a:extLst>
+              <a:ext uri="{FF2B5EF4-FFF2-40B4-BE49-F238E27FC236}">
+                <a16:creationId xmlns:a16="http://schemas.microsoft.com/office/drawing/2014/main" id="{D9734E45-10BA-D70F-CB4C-63DB25002E92}"/>
+              </a:ext>
+            </a:extLst>
+          </p:cNvPr>
+          <p:cNvPicPr>
+            <a:picLocks noChangeAspect="1"/>
+          </p:cNvPicPr>
+          <p:nvPr/>
+        </p:nvPicPr>
+        <p:blipFill>
+          <a:blip r:embed="rId5">
+            <a:extLst>
+              <a:ext uri="{28A0092B-C50C-407E-A947-70E740481C1C}">
+                <a14:useLocalDpi xmlns:a14="http://schemas.microsoft.com/office/drawing/2010/main" val="0"/>
+              </a:ext>
+            </a:extLst>
+          </a:blip>
+          <a:stretch>
+            <a:fillRect/>
+          </a:stretch>
+        </p:blipFill>
+        <p:spPr>
+          <a:xfrm>
+            <a:off x="4160913" y="2796489"/>
+            <a:ext cx="644070" cy="644070"/>
+          </a:xfrm>
+          <a:prstGeom prst="rect">
+            <a:avLst/>
+          </a:prstGeom>
+        </p:spPr>
+      </p:pic>
+      <p:pic>
+        <p:nvPicPr>
+          <p:cNvPr id="16" name="Picture 15" descr="A clock with a blue border&#10;&#10;AI-generated content may be incorrect.">
+            <a:extLst>
+              <a:ext uri="{FF2B5EF4-FFF2-40B4-BE49-F238E27FC236}">
+                <a16:creationId xmlns:a16="http://schemas.microsoft.com/office/drawing/2014/main" id="{36CE0A37-2CD6-4565-8E20-542D8886A9B8}"/>
+              </a:ext>
+            </a:extLst>
+          </p:cNvPr>
+          <p:cNvPicPr>
+            <a:picLocks noChangeAspect="1"/>
+          </p:cNvPicPr>
+          <p:nvPr/>
+        </p:nvPicPr>
+        <p:blipFill>
+          <a:blip r:embed="rId6">
+            <a:extLst>
+              <a:ext uri="{28A0092B-C50C-407E-A947-70E740481C1C}">
+                <a14:useLocalDpi xmlns:a14="http://schemas.microsoft.com/office/drawing/2010/main" val="0"/>
+              </a:ext>
+            </a:extLst>
+          </a:blip>
+          <a:stretch>
+            <a:fillRect/>
+          </a:stretch>
+        </p:blipFill>
+        <p:spPr>
+          <a:xfrm>
+            <a:off x="149778" y="1204128"/>
+            <a:ext cx="668825" cy="668825"/>
+          </a:xfrm>
+          <a:prstGeom prst="rect">
+            <a:avLst/>
+          </a:prstGeom>
+        </p:spPr>
+      </p:pic>
+      <p:pic>
+        <p:nvPicPr>
+          <p:cNvPr id="20" name="Picture 19" descr="A yellow padlock with a keyhole&#10;&#10;AI-generated content may be incorrect.">
+            <a:extLst>
+              <a:ext uri="{FF2B5EF4-FFF2-40B4-BE49-F238E27FC236}">
+                <a16:creationId xmlns:a16="http://schemas.microsoft.com/office/drawing/2014/main" id="{87ABB413-8D2C-ADF1-68B1-DB9F6340945B}"/>
+              </a:ext>
+            </a:extLst>
+          </p:cNvPr>
+          <p:cNvPicPr>
+            <a:picLocks noChangeAspect="1"/>
+          </p:cNvPicPr>
+          <p:nvPr/>
+        </p:nvPicPr>
+        <p:blipFill>
+          <a:blip r:embed="rId7">
+            <a:extLst>
+              <a:ext uri="{28A0092B-C50C-407E-A947-70E740481C1C}">
+                <a14:useLocalDpi xmlns:a14="http://schemas.microsoft.com/office/drawing/2010/main" val="0"/>
+              </a:ext>
+            </a:extLst>
+          </a:blip>
+          <a:stretch>
+            <a:fillRect/>
+          </a:stretch>
+        </p:blipFill>
+        <p:spPr>
+          <a:xfrm>
+            <a:off x="234517" y="2881553"/>
+            <a:ext cx="542358" cy="542358"/>
+          </a:xfrm>
+          <a:prstGeom prst="rect">
+            <a:avLst/>
+          </a:prstGeom>
+        </p:spPr>
+      </p:pic>
+      <p:pic>
+        <p:nvPicPr>
+          <p:cNvPr id="32" name="Picture 31" descr="A green wifi symbol on a black background&#10;&#10;AI-generated content may be incorrect.">
+            <a:extLst>
+              <a:ext uri="{FF2B5EF4-FFF2-40B4-BE49-F238E27FC236}">
+                <a16:creationId xmlns:a16="http://schemas.microsoft.com/office/drawing/2014/main" id="{461F1412-1E1D-A047-AAF9-07E465C0C6EF}"/>
+              </a:ext>
+            </a:extLst>
+          </p:cNvPr>
+          <p:cNvPicPr>
+            <a:picLocks noChangeAspect="1"/>
+          </p:cNvPicPr>
+          <p:nvPr/>
+        </p:nvPicPr>
+        <p:blipFill>
+          <a:blip r:embed="rId8">
+            <a:extLst>
+              <a:ext uri="{28A0092B-C50C-407E-A947-70E740481C1C}">
+                <a14:useLocalDpi xmlns:a14="http://schemas.microsoft.com/office/drawing/2010/main" val="0"/>
+              </a:ext>
+            </a:extLst>
+          </a:blip>
+          <a:stretch>
+            <a:fillRect/>
+          </a:stretch>
+        </p:blipFill>
+        <p:spPr>
+          <a:xfrm>
+            <a:off x="4081783" y="3853922"/>
+            <a:ext cx="554134" cy="554134"/>
+          </a:xfrm>
+          <a:prstGeom prst="rect">
+            <a:avLst/>
+          </a:prstGeom>
+        </p:spPr>
+      </p:pic>
+      <p:sp>
+        <p:nvSpPr>
+          <p:cNvPr id="37" name="TextBox 36">
+            <a:extLst>
+              <a:ext uri="{FF2B5EF4-FFF2-40B4-BE49-F238E27FC236}">
+                <a16:creationId xmlns:a16="http://schemas.microsoft.com/office/drawing/2014/main" id="{4321C3DA-7AC2-F1CA-447C-6FD1950E26EF}"/>
+              </a:ext>
+            </a:extLst>
+          </p:cNvPr>
+          <p:cNvSpPr txBox="1"/>
+          <p:nvPr/>
+        </p:nvSpPr>
+        <p:spPr>
+          <a:xfrm>
+            <a:off x="818602" y="2146420"/>
+            <a:ext cx="976934" cy="461665"/>
+          </a:xfrm>
+          <a:prstGeom prst="rect">
+            <a:avLst/>
+          </a:prstGeom>
+          <a:noFill/>
+        </p:spPr>
+        <p:txBody>
+          <a:bodyPr wrap="none" rtlCol="0">
+            <a:spAutoFit/>
+          </a:bodyPr>
+          <a:lstStyle/>
+          <a:p>
+            <a:r>
+              <a:rPr lang="en-US" sz="1200" dirty="0"/>
+              <a:t>Latitude: -</a:t>
+            </a:r>
+          </a:p>
+          <a:p>
+            <a:r>
+              <a:rPr lang="en-US" sz="1200" dirty="0"/>
+              <a:t>Longitude: -</a:t>
+            </a:r>
+          </a:p>
+        </p:txBody>
+      </p:sp>
+      <p:sp>
+        <p:nvSpPr>
+          <p:cNvPr id="38" name="TextBox 37">
+            <a:extLst>
+              <a:ext uri="{FF2B5EF4-FFF2-40B4-BE49-F238E27FC236}">
+                <a16:creationId xmlns:a16="http://schemas.microsoft.com/office/drawing/2014/main" id="{08E52FD1-DF26-6675-04D7-D62D7D384901}"/>
+              </a:ext>
+            </a:extLst>
+          </p:cNvPr>
+          <p:cNvSpPr txBox="1"/>
+          <p:nvPr/>
+        </p:nvSpPr>
+        <p:spPr>
+          <a:xfrm>
+            <a:off x="818602" y="1400040"/>
+            <a:ext cx="987771" cy="276999"/>
+          </a:xfrm>
+          <a:prstGeom prst="rect">
+            <a:avLst/>
+          </a:prstGeom>
+          <a:noFill/>
+        </p:spPr>
+        <p:txBody>
+          <a:bodyPr wrap="none" rtlCol="0">
+            <a:spAutoFit/>
+          </a:bodyPr>
+          <a:lstStyle/>
+          <a:p>
+            <a:r>
+              <a:rPr lang="en-US" sz="1200" dirty="0"/>
+              <a:t>Time: --:--:--</a:t>
+            </a:r>
+          </a:p>
+        </p:txBody>
+      </p:sp>
+      <p:sp>
+        <p:nvSpPr>
+          <p:cNvPr id="39" name="TextBox 38">
+            <a:extLst>
+              <a:ext uri="{FF2B5EF4-FFF2-40B4-BE49-F238E27FC236}">
+                <a16:creationId xmlns:a16="http://schemas.microsoft.com/office/drawing/2014/main" id="{25260AFE-D63E-CBFB-29F6-A5FB57B5E09F}"/>
+              </a:ext>
+            </a:extLst>
+          </p:cNvPr>
+          <p:cNvSpPr txBox="1"/>
+          <p:nvPr/>
+        </p:nvSpPr>
+        <p:spPr>
+          <a:xfrm>
+            <a:off x="818602" y="3077466"/>
+            <a:ext cx="950068" cy="276999"/>
+          </a:xfrm>
+          <a:prstGeom prst="rect">
+            <a:avLst/>
+          </a:prstGeom>
+          <a:noFill/>
+        </p:spPr>
+        <p:txBody>
+          <a:bodyPr wrap="none" rtlCol="0">
+            <a:spAutoFit/>
+          </a:bodyPr>
+          <a:lstStyle/>
+          <a:p>
+            <a:r>
+              <a:rPr lang="en-US" sz="1200" dirty="0"/>
+              <a:t>Lock status</a:t>
+            </a:r>
+          </a:p>
+        </p:txBody>
+      </p:sp>
+      <p:sp>
+        <p:nvSpPr>
+          <p:cNvPr id="41" name="TextBox 40">
+            <a:extLst>
+              <a:ext uri="{FF2B5EF4-FFF2-40B4-BE49-F238E27FC236}">
+                <a16:creationId xmlns:a16="http://schemas.microsoft.com/office/drawing/2014/main" id="{81FCA3BE-DA93-775E-2847-6476C88553CA}"/>
+              </a:ext>
+            </a:extLst>
+          </p:cNvPr>
+          <p:cNvSpPr txBox="1"/>
+          <p:nvPr/>
+        </p:nvSpPr>
+        <p:spPr>
+          <a:xfrm>
+            <a:off x="755910" y="3935143"/>
+            <a:ext cx="968727" cy="276999"/>
+          </a:xfrm>
+          <a:prstGeom prst="rect">
+            <a:avLst/>
+          </a:prstGeom>
+          <a:noFill/>
+        </p:spPr>
+        <p:txBody>
+          <a:bodyPr wrap="none" rtlCol="0">
+            <a:spAutoFit/>
+          </a:bodyPr>
+          <a:lstStyle/>
+          <a:p>
+            <a:r>
+              <a:rPr lang="en-US" sz="1200" dirty="0"/>
+              <a:t>Battery: --%</a:t>
+            </a:r>
+          </a:p>
+        </p:txBody>
+      </p:sp>
+    </p:spTree>
+    <p:extLst>
+      <p:ext uri="{BB962C8B-B14F-4D97-AF65-F5344CB8AC3E}">
+        <p14:creationId xmlns:p14="http://schemas.microsoft.com/office/powerpoint/2010/main" val="4286319542"/>
+      </p:ext>
+    </p:extLst>
+  </p:cSld>
+  <p:clrMapOvr>
+    <a:masterClrMapping/>
+  </p:clrMapOvr>
+</p:sld>
+</file>
+
+<file path=ppt/slides/slide3.xml><?xml version="1.0" encoding="utf-8"?>
+<p:sld xmlns:a="http://schemas.openxmlformats.org/drawingml/2006/main" xmlns:r="http://schemas.openxmlformats.org/officeDocument/2006/relationships" xmlns:p="http://schemas.openxmlformats.org/presentationml/2006/main">
+  <p:cSld>
+    <p:spTree>
+      <p:nvGrpSpPr>
+        <p:cNvPr id="1" name="">
+          <a:extLst>
+            <a:ext uri="{FF2B5EF4-FFF2-40B4-BE49-F238E27FC236}">
+              <a16:creationId xmlns:a16="http://schemas.microsoft.com/office/drawing/2014/main" id="{EA09E796-73F3-45C3-C27E-D4B4F7A03874}"/>
+            </a:ext>
+          </a:extLst>
+        </p:cNvPr>
+        <p:cNvGrpSpPr/>
+        <p:nvPr/>
+      </p:nvGrpSpPr>
+      <p:grpSpPr>
+        <a:xfrm>
+          <a:off x="0" y="0"/>
+          <a:ext cx="0" cy="0"/>
+          <a:chOff x="0" y="0"/>
+          <a:chExt cx="0" cy="0"/>
+        </a:xfrm>
+      </p:grpSpPr>
+      <p:pic>
+        <p:nvPicPr>
+          <p:cNvPr id="3" name="Picture 2">
+            <a:extLst>
+              <a:ext uri="{FF2B5EF4-FFF2-40B4-BE49-F238E27FC236}">
+                <a16:creationId xmlns:a16="http://schemas.microsoft.com/office/drawing/2014/main" id="{1FBD3C31-CFC9-167F-0087-D7856488583C}"/>
+              </a:ext>
+            </a:extLst>
+          </p:cNvPr>
+          <p:cNvPicPr>
+            <a:picLocks noChangeAspect="1"/>
+          </p:cNvPicPr>
+          <p:nvPr/>
+        </p:nvPicPr>
+        <p:blipFill>
+          <a:blip r:embed="rId2"/>
+          <a:srcRect r="5025" b="4775"/>
+          <a:stretch>
+            <a:fillRect/>
+          </a:stretch>
+        </p:blipFill>
+        <p:spPr>
+          <a:xfrm>
+            <a:off x="0" y="0"/>
+            <a:ext cx="12186650" cy="6083929"/>
+          </a:xfrm>
+          <a:prstGeom prst="rect">
+            <a:avLst/>
+          </a:prstGeom>
+        </p:spPr>
+      </p:pic>
+      <p:sp>
+        <p:nvSpPr>
+          <p:cNvPr id="4" name="Rectangle: Rounded Corners 3">
+            <a:extLst>
+              <a:ext uri="{FF2B5EF4-FFF2-40B4-BE49-F238E27FC236}">
+                <a16:creationId xmlns:a16="http://schemas.microsoft.com/office/drawing/2014/main" id="{172BC138-981E-0327-74C0-820EABAFC46F}"/>
+              </a:ext>
+            </a:extLst>
+          </p:cNvPr>
+          <p:cNvSpPr/>
+          <p:nvPr/>
+        </p:nvSpPr>
+        <p:spPr>
+          <a:xfrm>
+            <a:off x="0" y="1104524"/>
+            <a:ext cx="5106154" cy="2544024"/>
+          </a:xfrm>
+          <a:prstGeom prst="roundRect">
+            <a:avLst>
+              <a:gd name="adj" fmla="val 2601"/>
+            </a:avLst>
+          </a:prstGeom>
+          <a:solidFill>
+            <a:schemeClr val="bg1"/>
+          </a:solidFill>
+        </p:spPr>
+        <p:style>
+          <a:lnRef idx="2">
+            <a:schemeClr val="accent1">
+              <a:shade val="15000"/>
+            </a:schemeClr>
+          </a:lnRef>
+          <a:fillRef idx="1">
+            <a:schemeClr val="accent1"/>
+          </a:fillRef>
+          <a:effectRef idx="0">
+            <a:schemeClr val="accent1"/>
+          </a:effectRef>
+          <a:fontRef idx="minor">
+            <a:schemeClr val="lt1"/>
+          </a:fontRef>
+        </p:style>
+        <p:txBody>
+          <a:bodyPr rtlCol="0" anchor="ctr"/>
+          <a:lstStyle/>
+          <a:p>
+            <a:pPr algn="ctr"/>
+            <a:r>
+              <a:rPr lang="en-US" dirty="0"/>
+              <a:t>d</a:t>
+            </a:r>
+          </a:p>
+        </p:txBody>
+      </p:sp>
+      <p:sp>
+        <p:nvSpPr>
+          <p:cNvPr id="2" name="Rectangle: Rounded Corners 1">
+            <a:extLst>
+              <a:ext uri="{FF2B5EF4-FFF2-40B4-BE49-F238E27FC236}">
+                <a16:creationId xmlns:a16="http://schemas.microsoft.com/office/drawing/2014/main" id="{653B102F-0ADF-756A-5D93-A57779915322}"/>
+              </a:ext>
+            </a:extLst>
+          </p:cNvPr>
+          <p:cNvSpPr/>
+          <p:nvPr/>
+        </p:nvSpPr>
+        <p:spPr>
+          <a:xfrm>
+            <a:off x="184586" y="1221930"/>
+            <a:ext cx="2283329" cy="754842"/>
+          </a:xfrm>
+          <a:prstGeom prst="roundRect">
+            <a:avLst/>
+          </a:prstGeom>
+          <a:solidFill>
+            <a:schemeClr val="accent3">
+              <a:lumMod val="20000"/>
+              <a:lumOff val="80000"/>
+            </a:schemeClr>
+          </a:solidFill>
+        </p:spPr>
+        <p:style>
+          <a:lnRef idx="3">
+            <a:schemeClr val="lt1"/>
+          </a:lnRef>
+          <a:fillRef idx="1">
+            <a:schemeClr val="accent6"/>
+          </a:fillRef>
+          <a:effectRef idx="1">
+            <a:schemeClr val="accent6"/>
+          </a:effectRef>
+          <a:fontRef idx="minor">
+            <a:schemeClr val="lt1"/>
+          </a:fontRef>
+        </p:style>
+        <p:txBody>
+          <a:bodyPr rtlCol="0" anchor="ctr"/>
+          <a:lstStyle/>
+          <a:p>
+            <a:pPr algn="ctr"/>
+            <a:endParaRPr lang="en-US" dirty="0"/>
+          </a:p>
+        </p:txBody>
+      </p:sp>
+      <p:sp>
+        <p:nvSpPr>
+          <p:cNvPr id="7" name="TextBox 6">
+            <a:extLst>
+              <a:ext uri="{FF2B5EF4-FFF2-40B4-BE49-F238E27FC236}">
+                <a16:creationId xmlns:a16="http://schemas.microsoft.com/office/drawing/2014/main" id="{98B5F270-11AA-6355-8AFD-9A80064EC105}"/>
+              </a:ext>
+            </a:extLst>
+          </p:cNvPr>
+          <p:cNvSpPr txBox="1"/>
+          <p:nvPr/>
+        </p:nvSpPr>
+        <p:spPr>
+          <a:xfrm>
+            <a:off x="903342" y="1424403"/>
+            <a:ext cx="987771" cy="276999"/>
+          </a:xfrm>
+          <a:prstGeom prst="rect">
+            <a:avLst/>
+          </a:prstGeom>
+          <a:noFill/>
+        </p:spPr>
+        <p:txBody>
+          <a:bodyPr wrap="none" rtlCol="0">
+            <a:spAutoFit/>
+          </a:bodyPr>
+          <a:lstStyle/>
+          <a:p>
+            <a:r>
+              <a:rPr lang="en-US" sz="1200" dirty="0"/>
+              <a:t>Time: --:--:--</a:t>
+            </a:r>
+          </a:p>
+        </p:txBody>
+      </p:sp>
+      <p:sp>
+        <p:nvSpPr>
+          <p:cNvPr id="9" name="Rectangle: Rounded Corners 8">
+            <a:extLst>
+              <a:ext uri="{FF2B5EF4-FFF2-40B4-BE49-F238E27FC236}">
+                <a16:creationId xmlns:a16="http://schemas.microsoft.com/office/drawing/2014/main" id="{3AC44E53-92C6-F2EA-14D9-35DE8715ED9E}"/>
+              </a:ext>
+            </a:extLst>
+          </p:cNvPr>
+          <p:cNvSpPr/>
+          <p:nvPr/>
+        </p:nvSpPr>
+        <p:spPr>
+          <a:xfrm>
+            <a:off x="2645370" y="1221929"/>
+            <a:ext cx="2218099" cy="754842"/>
+          </a:xfrm>
+          <a:prstGeom prst="roundRect">
+            <a:avLst/>
+          </a:prstGeom>
+          <a:solidFill>
+            <a:schemeClr val="accent3">
+              <a:lumMod val="20000"/>
+              <a:lumOff val="80000"/>
+            </a:schemeClr>
+          </a:solidFill>
+        </p:spPr>
+        <p:style>
+          <a:lnRef idx="3">
+            <a:schemeClr val="lt1"/>
+          </a:lnRef>
+          <a:fillRef idx="1">
+            <a:schemeClr val="accent6"/>
+          </a:fillRef>
+          <a:effectRef idx="1">
+            <a:schemeClr val="accent6"/>
+          </a:effectRef>
+          <a:fontRef idx="minor">
+            <a:schemeClr val="lt1"/>
+          </a:fontRef>
+        </p:style>
+        <p:txBody>
+          <a:bodyPr rtlCol="0" anchor="ctr"/>
+          <a:lstStyle/>
+          <a:p>
+            <a:pPr algn="ctr"/>
+            <a:endParaRPr lang="en-US" dirty="0"/>
+          </a:p>
+        </p:txBody>
+      </p:sp>
+      <p:pic>
+        <p:nvPicPr>
+          <p:cNvPr id="11" name="Picture 10" descr="A map with a pin on it&#10;&#10;AI-generated content may be incorrect.">
+            <a:extLst>
+              <a:ext uri="{FF2B5EF4-FFF2-40B4-BE49-F238E27FC236}">
+                <a16:creationId xmlns:a16="http://schemas.microsoft.com/office/drawing/2014/main" id="{FAE7CFDC-9DE4-044A-82A8-B8E5BF3B12DF}"/>
+              </a:ext>
+            </a:extLst>
+          </p:cNvPr>
+          <p:cNvPicPr>
+            <a:picLocks noChangeAspect="1"/>
+          </p:cNvPicPr>
+          <p:nvPr/>
+        </p:nvPicPr>
+        <p:blipFill>
+          <a:blip r:embed="rId3">
+            <a:extLst>
+              <a:ext uri="{28A0092B-C50C-407E-A947-70E740481C1C}">
+                <a14:useLocalDpi xmlns:a14="http://schemas.microsoft.com/office/drawing/2010/main" val="0"/>
+              </a:ext>
+            </a:extLst>
+          </a:blip>
+          <a:stretch>
+            <a:fillRect/>
+          </a:stretch>
+        </p:blipFill>
+        <p:spPr>
+          <a:xfrm>
+            <a:off x="2840806" y="1264938"/>
+            <a:ext cx="542358" cy="542358"/>
+          </a:xfrm>
+          <a:prstGeom prst="rect">
+            <a:avLst/>
+          </a:prstGeom>
+        </p:spPr>
+      </p:pic>
+      <p:sp>
+        <p:nvSpPr>
+          <p:cNvPr id="12" name="TextBox 11">
+            <a:extLst>
+              <a:ext uri="{FF2B5EF4-FFF2-40B4-BE49-F238E27FC236}">
+                <a16:creationId xmlns:a16="http://schemas.microsoft.com/office/drawing/2014/main" id="{A2FAABF7-6EB0-6214-C96B-680A506FA2C3}"/>
+              </a:ext>
+            </a:extLst>
+          </p:cNvPr>
+          <p:cNvSpPr txBox="1"/>
+          <p:nvPr/>
+        </p:nvSpPr>
+        <p:spPr>
+          <a:xfrm>
+            <a:off x="3424891" y="1387483"/>
+            <a:ext cx="976934" cy="461665"/>
+          </a:xfrm>
+          <a:prstGeom prst="rect">
+            <a:avLst/>
+          </a:prstGeom>
+          <a:noFill/>
+        </p:spPr>
+        <p:txBody>
+          <a:bodyPr wrap="none" rtlCol="0">
+            <a:spAutoFit/>
+          </a:bodyPr>
+          <a:lstStyle/>
+          <a:p>
+            <a:r>
+              <a:rPr lang="en-US" sz="1200" dirty="0"/>
+              <a:t>Latitude: -</a:t>
+            </a:r>
+          </a:p>
+          <a:p>
+            <a:r>
+              <a:rPr lang="en-US" sz="1200" dirty="0"/>
+              <a:t>Longitude: -</a:t>
+            </a:r>
+          </a:p>
+        </p:txBody>
+      </p:sp>
+      <p:sp>
+        <p:nvSpPr>
+          <p:cNvPr id="13" name="Rectangle: Rounded Corners 12">
+            <a:extLst>
+              <a:ext uri="{FF2B5EF4-FFF2-40B4-BE49-F238E27FC236}">
+                <a16:creationId xmlns:a16="http://schemas.microsoft.com/office/drawing/2014/main" id="{AAF40E78-CA10-2669-2AA7-178EB9E2BF80}"/>
+              </a:ext>
+            </a:extLst>
+          </p:cNvPr>
+          <p:cNvSpPr/>
+          <p:nvPr/>
+        </p:nvSpPr>
+        <p:spPr>
+          <a:xfrm>
+            <a:off x="184585" y="2043861"/>
+            <a:ext cx="2283329" cy="754842"/>
+          </a:xfrm>
+          <a:prstGeom prst="roundRect">
+            <a:avLst/>
+          </a:prstGeom>
+          <a:solidFill>
+            <a:schemeClr val="accent3">
+              <a:lumMod val="20000"/>
+              <a:lumOff val="80000"/>
+            </a:schemeClr>
+          </a:solidFill>
+        </p:spPr>
+        <p:style>
+          <a:lnRef idx="3">
+            <a:schemeClr val="lt1"/>
+          </a:lnRef>
+          <a:fillRef idx="1">
+            <a:schemeClr val="accent6"/>
+          </a:fillRef>
+          <a:effectRef idx="1">
+            <a:schemeClr val="accent6"/>
+          </a:effectRef>
+          <a:fontRef idx="minor">
+            <a:schemeClr val="lt1"/>
+          </a:fontRef>
+        </p:style>
+        <p:txBody>
+          <a:bodyPr rtlCol="0" anchor="ctr"/>
+          <a:lstStyle/>
+          <a:p>
+            <a:pPr algn="ctr"/>
+            <a:endParaRPr lang="en-US" dirty="0"/>
+          </a:p>
+        </p:txBody>
+      </p:sp>
+      <p:pic>
+        <p:nvPicPr>
+          <p:cNvPr id="14" name="Picture 13" descr="A yellow padlock with a keyhole&#10;&#10;AI-generated content may be incorrect.">
+            <a:extLst>
+              <a:ext uri="{FF2B5EF4-FFF2-40B4-BE49-F238E27FC236}">
+                <a16:creationId xmlns:a16="http://schemas.microsoft.com/office/drawing/2014/main" id="{B8BA4FC4-A325-1480-3E05-87121D653327}"/>
+              </a:ext>
+            </a:extLst>
+          </p:cNvPr>
+          <p:cNvPicPr>
+            <a:picLocks noChangeAspect="1"/>
+          </p:cNvPicPr>
+          <p:nvPr/>
+        </p:nvPicPr>
+        <p:blipFill>
+          <a:blip r:embed="rId4">
+            <a:extLst>
+              <a:ext uri="{28A0092B-C50C-407E-A947-70E740481C1C}">
+                <a14:useLocalDpi xmlns:a14="http://schemas.microsoft.com/office/drawing/2010/main" val="0"/>
+              </a:ext>
+            </a:extLst>
+          </a:blip>
+          <a:stretch>
+            <a:fillRect/>
+          </a:stretch>
+        </p:blipFill>
+        <p:spPr>
+          <a:xfrm>
+            <a:off x="260238" y="2111155"/>
+            <a:ext cx="542358" cy="542358"/>
+          </a:xfrm>
+          <a:prstGeom prst="rect">
+            <a:avLst/>
+          </a:prstGeom>
+        </p:spPr>
+      </p:pic>
+      <p:sp>
+        <p:nvSpPr>
+          <p:cNvPr id="15" name="TextBox 14">
+            <a:extLst>
+              <a:ext uri="{FF2B5EF4-FFF2-40B4-BE49-F238E27FC236}">
+                <a16:creationId xmlns:a16="http://schemas.microsoft.com/office/drawing/2014/main" id="{7E5F978F-1D88-3509-21FC-25E3CFA801FE}"/>
+              </a:ext>
+            </a:extLst>
+          </p:cNvPr>
+          <p:cNvSpPr txBox="1"/>
+          <p:nvPr/>
+        </p:nvSpPr>
+        <p:spPr>
+          <a:xfrm>
+            <a:off x="844323" y="2307068"/>
+            <a:ext cx="950068" cy="276999"/>
+          </a:xfrm>
+          <a:prstGeom prst="rect">
+            <a:avLst/>
+          </a:prstGeom>
+          <a:noFill/>
+        </p:spPr>
+        <p:txBody>
+          <a:bodyPr wrap="none" rtlCol="0">
+            <a:spAutoFit/>
+          </a:bodyPr>
+          <a:lstStyle/>
+          <a:p>
+            <a:r>
+              <a:rPr lang="en-US" sz="1200" dirty="0"/>
+              <a:t>Lock status</a:t>
+            </a:r>
+          </a:p>
+        </p:txBody>
+      </p:sp>
+      <p:sp>
+        <p:nvSpPr>
+          <p:cNvPr id="17" name="Rectangle: Rounded Corners 16">
+            <a:extLst>
+              <a:ext uri="{FF2B5EF4-FFF2-40B4-BE49-F238E27FC236}">
+                <a16:creationId xmlns:a16="http://schemas.microsoft.com/office/drawing/2014/main" id="{29C14D87-5E10-B39A-0C63-160573B26855}"/>
+              </a:ext>
+            </a:extLst>
+          </p:cNvPr>
+          <p:cNvSpPr/>
+          <p:nvPr/>
+        </p:nvSpPr>
+        <p:spPr>
+          <a:xfrm>
+            <a:off x="2652500" y="2034834"/>
+            <a:ext cx="2218100" cy="754842"/>
+          </a:xfrm>
+          <a:prstGeom prst="roundRect">
+            <a:avLst/>
+          </a:prstGeom>
+          <a:solidFill>
+            <a:schemeClr val="accent3">
+              <a:lumMod val="20000"/>
+              <a:lumOff val="80000"/>
+            </a:schemeClr>
+          </a:solidFill>
+        </p:spPr>
+        <p:style>
+          <a:lnRef idx="3">
+            <a:schemeClr val="lt1"/>
+          </a:lnRef>
+          <a:fillRef idx="1">
+            <a:schemeClr val="accent6"/>
+          </a:fillRef>
+          <a:effectRef idx="1">
+            <a:schemeClr val="accent6"/>
+          </a:effectRef>
+          <a:fontRef idx="minor">
+            <a:schemeClr val="lt1"/>
+          </a:fontRef>
+        </p:style>
+        <p:txBody>
+          <a:bodyPr rtlCol="0" anchor="ctr"/>
+          <a:lstStyle/>
+          <a:p>
+            <a:pPr algn="ctr"/>
+            <a:endParaRPr lang="en-US" dirty="0"/>
+          </a:p>
+        </p:txBody>
+      </p:sp>
+      <p:pic>
+        <p:nvPicPr>
+          <p:cNvPr id="18" name="Picture 17" descr="A green battery with black background&#10;&#10;AI-generated content may be incorrect.">
+            <a:extLst>
+              <a:ext uri="{FF2B5EF4-FFF2-40B4-BE49-F238E27FC236}">
+                <a16:creationId xmlns:a16="http://schemas.microsoft.com/office/drawing/2014/main" id="{CE97EB37-C094-D57B-B341-56D3EB306798}"/>
+              </a:ext>
+            </a:extLst>
+          </p:cNvPr>
+          <p:cNvPicPr>
+            <a:picLocks noChangeAspect="1"/>
+          </p:cNvPicPr>
+          <p:nvPr/>
+        </p:nvPicPr>
+        <p:blipFill>
+          <a:blip r:embed="rId5">
+            <a:extLst>
+              <a:ext uri="{28A0092B-C50C-407E-A947-70E740481C1C}">
+                <a14:useLocalDpi xmlns:a14="http://schemas.microsoft.com/office/drawing/2010/main" val="0"/>
+              </a:ext>
+            </a:extLst>
+          </a:blip>
+          <a:stretch>
+            <a:fillRect/>
+          </a:stretch>
+        </p:blipFill>
+        <p:spPr>
+          <a:xfrm>
+            <a:off x="2756066" y="2080008"/>
+            <a:ext cx="668825" cy="668825"/>
+          </a:xfrm>
+          <a:prstGeom prst="rect">
+            <a:avLst/>
+          </a:prstGeom>
+        </p:spPr>
+      </p:pic>
+      <p:sp>
+        <p:nvSpPr>
+          <p:cNvPr id="19" name="TextBox 18">
+            <a:extLst>
+              <a:ext uri="{FF2B5EF4-FFF2-40B4-BE49-F238E27FC236}">
+                <a16:creationId xmlns:a16="http://schemas.microsoft.com/office/drawing/2014/main" id="{6D81E233-2E67-69C8-FFAB-AE8C1526724A}"/>
+              </a:ext>
+            </a:extLst>
+          </p:cNvPr>
+          <p:cNvSpPr txBox="1"/>
+          <p:nvPr/>
+        </p:nvSpPr>
+        <p:spPr>
+          <a:xfrm>
+            <a:off x="3362199" y="2275920"/>
+            <a:ext cx="968727" cy="276999"/>
+          </a:xfrm>
+          <a:prstGeom prst="rect">
+            <a:avLst/>
+          </a:prstGeom>
+          <a:noFill/>
+        </p:spPr>
+        <p:txBody>
+          <a:bodyPr wrap="none" rtlCol="0">
+            <a:spAutoFit/>
+          </a:bodyPr>
+          <a:lstStyle/>
+          <a:p>
+            <a:r>
+              <a:rPr lang="en-US" sz="1200" dirty="0"/>
+              <a:t>Battery: --%</a:t>
+            </a:r>
+          </a:p>
+        </p:txBody>
+      </p:sp>
+      <p:sp>
+        <p:nvSpPr>
+          <p:cNvPr id="21" name="Rectangle: Rounded Corners 20">
+            <a:extLst>
+              <a:ext uri="{FF2B5EF4-FFF2-40B4-BE49-F238E27FC236}">
+                <a16:creationId xmlns:a16="http://schemas.microsoft.com/office/drawing/2014/main" id="{BCACCB89-8345-130A-EEE1-786B6250E8F4}"/>
+              </a:ext>
+            </a:extLst>
+          </p:cNvPr>
+          <p:cNvSpPr/>
+          <p:nvPr/>
+        </p:nvSpPr>
+        <p:spPr>
+          <a:xfrm>
+            <a:off x="184585" y="2950060"/>
+            <a:ext cx="1070922" cy="562436"/>
+          </a:xfrm>
+          <a:prstGeom prst="roundRect">
+            <a:avLst/>
+          </a:prstGeom>
+          <a:solidFill>
+            <a:schemeClr val="bg1">
+              <a:lumMod val="95000"/>
+            </a:schemeClr>
+          </a:solidFill>
+        </p:spPr>
+        <p:style>
+          <a:lnRef idx="3">
+            <a:schemeClr val="lt1"/>
+          </a:lnRef>
+          <a:fillRef idx="1">
+            <a:schemeClr val="accent6"/>
+          </a:fillRef>
+          <a:effectRef idx="1">
+            <a:schemeClr val="accent6"/>
+          </a:effectRef>
+          <a:fontRef idx="minor">
+            <a:schemeClr val="lt1"/>
+          </a:fontRef>
+        </p:style>
+        <p:txBody>
+          <a:bodyPr rtlCol="0" anchor="ctr"/>
+          <a:lstStyle/>
+          <a:p>
+            <a:pPr algn="ctr"/>
+            <a:endParaRPr lang="en-US" dirty="0"/>
+          </a:p>
+        </p:txBody>
+      </p:sp>
+      <p:sp>
+        <p:nvSpPr>
+          <p:cNvPr id="23" name="Rectangle: Rounded Corners 22">
+            <a:extLst>
+              <a:ext uri="{FF2B5EF4-FFF2-40B4-BE49-F238E27FC236}">
+                <a16:creationId xmlns:a16="http://schemas.microsoft.com/office/drawing/2014/main" id="{BF5D9239-791A-B5C5-5B76-0CA507883EFE}"/>
+              </a:ext>
+            </a:extLst>
+          </p:cNvPr>
+          <p:cNvSpPr/>
+          <p:nvPr/>
+        </p:nvSpPr>
+        <p:spPr>
+          <a:xfrm>
+            <a:off x="1393908" y="2947100"/>
+            <a:ext cx="1070922" cy="562436"/>
+          </a:xfrm>
+          <a:prstGeom prst="roundRect">
+            <a:avLst/>
+          </a:prstGeom>
+          <a:solidFill>
+            <a:schemeClr val="bg1">
+              <a:lumMod val="95000"/>
+            </a:schemeClr>
+          </a:solidFill>
+        </p:spPr>
+        <p:style>
+          <a:lnRef idx="3">
+            <a:schemeClr val="lt1"/>
+          </a:lnRef>
+          <a:fillRef idx="1">
+            <a:schemeClr val="accent6"/>
+          </a:fillRef>
+          <a:effectRef idx="1">
+            <a:schemeClr val="accent6"/>
+          </a:effectRef>
+          <a:fontRef idx="minor">
+            <a:schemeClr val="lt1"/>
+          </a:fontRef>
+        </p:style>
+        <p:txBody>
+          <a:bodyPr rtlCol="0" anchor="ctr"/>
+          <a:lstStyle/>
+          <a:p>
+            <a:pPr algn="ctr"/>
+            <a:endParaRPr lang="en-US" dirty="0"/>
+          </a:p>
+        </p:txBody>
+      </p:sp>
+      <p:pic>
+        <p:nvPicPr>
+          <p:cNvPr id="24" name="Picture 23" descr="A green wifi symbol on a black background&#10;&#10;AI-generated content may be incorrect.">
+            <a:extLst>
+              <a:ext uri="{FF2B5EF4-FFF2-40B4-BE49-F238E27FC236}">
+                <a16:creationId xmlns:a16="http://schemas.microsoft.com/office/drawing/2014/main" id="{404BE856-8FE6-51C5-4F60-ED1E493EC219}"/>
+              </a:ext>
+            </a:extLst>
+          </p:cNvPr>
+          <p:cNvPicPr>
+            <a:picLocks noChangeAspect="1"/>
+          </p:cNvPicPr>
+          <p:nvPr/>
+        </p:nvPicPr>
+        <p:blipFill>
+          <a:blip r:embed="rId6">
+            <a:extLst>
+              <a:ext uri="{28A0092B-C50C-407E-A947-70E740481C1C}">
+                <a14:useLocalDpi xmlns:a14="http://schemas.microsoft.com/office/drawing/2010/main" val="0"/>
+              </a:ext>
+            </a:extLst>
+          </a:blip>
+          <a:stretch>
+            <a:fillRect/>
+          </a:stretch>
+        </p:blipFill>
+        <p:spPr>
+          <a:xfrm>
+            <a:off x="1484930" y="3058452"/>
+            <a:ext cx="339731" cy="339731"/>
+          </a:xfrm>
+          <a:prstGeom prst="rect">
+            <a:avLst/>
+          </a:prstGeom>
+        </p:spPr>
+      </p:pic>
+      <p:sp>
+        <p:nvSpPr>
+          <p:cNvPr id="25" name="Rectangle: Rounded Corners 24">
+            <a:extLst>
+              <a:ext uri="{FF2B5EF4-FFF2-40B4-BE49-F238E27FC236}">
+                <a16:creationId xmlns:a16="http://schemas.microsoft.com/office/drawing/2014/main" id="{6DE3D7D1-C54F-07D2-BD40-588D9EE5FEC8}"/>
+              </a:ext>
+            </a:extLst>
+          </p:cNvPr>
+          <p:cNvSpPr/>
+          <p:nvPr/>
+        </p:nvSpPr>
+        <p:spPr>
+          <a:xfrm>
+            <a:off x="2569538" y="2937879"/>
+            <a:ext cx="1070922" cy="562436"/>
+          </a:xfrm>
+          <a:prstGeom prst="roundRect">
+            <a:avLst/>
+          </a:prstGeom>
+          <a:solidFill>
+            <a:schemeClr val="bg1">
+              <a:lumMod val="95000"/>
+            </a:schemeClr>
+          </a:solidFill>
+        </p:spPr>
+        <p:style>
+          <a:lnRef idx="3">
+            <a:schemeClr val="lt1"/>
+          </a:lnRef>
+          <a:fillRef idx="1">
+            <a:schemeClr val="accent6"/>
+          </a:fillRef>
+          <a:effectRef idx="1">
+            <a:schemeClr val="accent6"/>
+          </a:effectRef>
+          <a:fontRef idx="minor">
+            <a:schemeClr val="lt1"/>
+          </a:fontRef>
+        </p:style>
+        <p:txBody>
+          <a:bodyPr rtlCol="0" anchor="ctr"/>
+          <a:lstStyle/>
+          <a:p>
+            <a:pPr algn="ctr"/>
+            <a:endParaRPr lang="en-US" dirty="0"/>
+          </a:p>
+        </p:txBody>
+      </p:sp>
+      <p:sp>
+        <p:nvSpPr>
+          <p:cNvPr id="27" name="Rectangle: Rounded Corners 26">
+            <a:extLst>
+              <a:ext uri="{FF2B5EF4-FFF2-40B4-BE49-F238E27FC236}">
+                <a16:creationId xmlns:a16="http://schemas.microsoft.com/office/drawing/2014/main" id="{911444E1-410C-2F68-4B90-B5072994AC3E}"/>
+              </a:ext>
+            </a:extLst>
+          </p:cNvPr>
+          <p:cNvSpPr/>
+          <p:nvPr/>
+        </p:nvSpPr>
+        <p:spPr>
+          <a:xfrm>
+            <a:off x="3792547" y="2947100"/>
+            <a:ext cx="1070922" cy="562436"/>
+          </a:xfrm>
+          <a:prstGeom prst="roundRect">
+            <a:avLst/>
+          </a:prstGeom>
+          <a:solidFill>
+            <a:schemeClr val="bg1">
+              <a:lumMod val="95000"/>
+            </a:schemeClr>
+          </a:solidFill>
+        </p:spPr>
+        <p:style>
+          <a:lnRef idx="3">
+            <a:schemeClr val="lt1"/>
+          </a:lnRef>
+          <a:fillRef idx="1">
+            <a:schemeClr val="accent6"/>
+          </a:fillRef>
+          <a:effectRef idx="1">
+            <a:schemeClr val="accent6"/>
+          </a:effectRef>
+          <a:fontRef idx="minor">
+            <a:schemeClr val="lt1"/>
+          </a:fontRef>
+        </p:style>
+        <p:txBody>
+          <a:bodyPr rtlCol="0" anchor="ctr"/>
+          <a:lstStyle/>
+          <a:p>
+            <a:pPr algn="ctr"/>
+            <a:endParaRPr lang="en-US" dirty="0"/>
+          </a:p>
+        </p:txBody>
+      </p:sp>
+      <p:pic>
+        <p:nvPicPr>
+          <p:cNvPr id="29" name="Picture 28" descr="A black background with a black square&#10;&#10;AI-generated content may be incorrect.">
+            <a:extLst>
+              <a:ext uri="{FF2B5EF4-FFF2-40B4-BE49-F238E27FC236}">
+                <a16:creationId xmlns:a16="http://schemas.microsoft.com/office/drawing/2014/main" id="{8045FB54-34DE-7980-683B-7CC6981EBE50}"/>
+              </a:ext>
+            </a:extLst>
+          </p:cNvPr>
+          <p:cNvPicPr>
+            <a:picLocks noChangeAspect="1"/>
+          </p:cNvPicPr>
+          <p:nvPr/>
+        </p:nvPicPr>
+        <p:blipFill>
+          <a:blip r:embed="rId7">
+            <a:extLst>
+              <a:ext uri="{28A0092B-C50C-407E-A947-70E740481C1C}">
+                <a14:useLocalDpi xmlns:a14="http://schemas.microsoft.com/office/drawing/2010/main" val="0"/>
+              </a:ext>
+            </a:extLst>
+          </a:blip>
+          <a:stretch>
+            <a:fillRect/>
+          </a:stretch>
+        </p:blipFill>
+        <p:spPr>
+          <a:xfrm>
+            <a:off x="882804" y="3129994"/>
+            <a:ext cx="299006" cy="299006"/>
+          </a:xfrm>
+          <a:prstGeom prst="rect">
+            <a:avLst/>
+          </a:prstGeom>
+        </p:spPr>
+      </p:pic>
+      <p:pic>
+        <p:nvPicPr>
+          <p:cNvPr id="31" name="Picture 30" descr="A black background with a black square&#10;&#10;AI-generated content may be incorrect.">
+            <a:extLst>
+              <a:ext uri="{FF2B5EF4-FFF2-40B4-BE49-F238E27FC236}">
+                <a16:creationId xmlns:a16="http://schemas.microsoft.com/office/drawing/2014/main" id="{0E9458F2-2B94-E948-F2FB-354A20465E50}"/>
+              </a:ext>
+            </a:extLst>
+          </p:cNvPr>
+          <p:cNvPicPr>
+            <a:picLocks noChangeAspect="1"/>
+          </p:cNvPicPr>
+          <p:nvPr/>
+        </p:nvPicPr>
+        <p:blipFill>
+          <a:blip r:embed="rId8">
+            <a:extLst>
+              <a:ext uri="{28A0092B-C50C-407E-A947-70E740481C1C}">
+                <a14:useLocalDpi xmlns:a14="http://schemas.microsoft.com/office/drawing/2010/main" val="0"/>
+              </a:ext>
+            </a:extLst>
+          </a:blip>
+          <a:stretch>
+            <a:fillRect/>
+          </a:stretch>
+        </p:blipFill>
+        <p:spPr>
+          <a:xfrm>
+            <a:off x="300677" y="1335210"/>
+            <a:ext cx="513938" cy="513938"/>
+          </a:xfrm>
+          <a:prstGeom prst="rect">
+            <a:avLst/>
+          </a:prstGeom>
+        </p:spPr>
+      </p:pic>
+      <p:pic>
+        <p:nvPicPr>
+          <p:cNvPr id="34" name="Picture 33" descr="A thermometer with a black background&#10;&#10;AI-generated content may be incorrect.">
+            <a:extLst>
+              <a:ext uri="{FF2B5EF4-FFF2-40B4-BE49-F238E27FC236}">
+                <a16:creationId xmlns:a16="http://schemas.microsoft.com/office/drawing/2014/main" id="{49ACD9AF-49A2-CCB4-2AC4-E286C6089DCD}"/>
+              </a:ext>
+            </a:extLst>
+          </p:cNvPr>
+          <p:cNvPicPr>
+            <a:picLocks noChangeAspect="1"/>
+          </p:cNvPicPr>
+          <p:nvPr/>
+        </p:nvPicPr>
+        <p:blipFill>
+          <a:blip r:embed="rId9">
+            <a:extLst>
+              <a:ext uri="{28A0092B-C50C-407E-A947-70E740481C1C}">
+                <a14:useLocalDpi xmlns:a14="http://schemas.microsoft.com/office/drawing/2010/main" val="0"/>
+              </a:ext>
+            </a:extLst>
+          </a:blip>
+          <a:stretch>
+            <a:fillRect/>
+          </a:stretch>
+        </p:blipFill>
+        <p:spPr>
+          <a:xfrm>
+            <a:off x="174234" y="3015545"/>
+            <a:ext cx="407101" cy="407101"/>
+          </a:xfrm>
+          <a:prstGeom prst="rect">
+            <a:avLst/>
+          </a:prstGeom>
+        </p:spPr>
+      </p:pic>
+      <p:pic>
+        <p:nvPicPr>
+          <p:cNvPr id="36" name="Picture 35" descr="A black background with a black square&#10;&#10;AI-generated content may be incorrect.">
+            <a:extLst>
+              <a:ext uri="{FF2B5EF4-FFF2-40B4-BE49-F238E27FC236}">
+                <a16:creationId xmlns:a16="http://schemas.microsoft.com/office/drawing/2014/main" id="{5990AEEF-4A4A-FB3D-56AA-16E7D0C94054}"/>
+              </a:ext>
+            </a:extLst>
+          </p:cNvPr>
+          <p:cNvPicPr>
+            <a:picLocks noChangeAspect="1"/>
+          </p:cNvPicPr>
+          <p:nvPr/>
+        </p:nvPicPr>
+        <p:blipFill>
+          <a:blip r:embed="rId10">
+            <a:extLst>
+              <a:ext uri="{28A0092B-C50C-407E-A947-70E740481C1C}">
+                <a14:useLocalDpi xmlns:a14="http://schemas.microsoft.com/office/drawing/2010/main" val="0"/>
+              </a:ext>
+            </a:extLst>
+          </a:blip>
+          <a:stretch>
+            <a:fillRect/>
+          </a:stretch>
+        </p:blipFill>
+        <p:spPr>
+          <a:xfrm>
+            <a:off x="2639928" y="2994842"/>
+            <a:ext cx="356770" cy="450551"/>
+          </a:xfrm>
+          <a:prstGeom prst="rect">
+            <a:avLst/>
+          </a:prstGeom>
+        </p:spPr>
+      </p:pic>
+      <p:pic>
+        <p:nvPicPr>
+          <p:cNvPr id="42" name="Picture 41" descr="A box with a white tape&#10;&#10;AI-generated content may be incorrect.">
+            <a:extLst>
+              <a:ext uri="{FF2B5EF4-FFF2-40B4-BE49-F238E27FC236}">
+                <a16:creationId xmlns:a16="http://schemas.microsoft.com/office/drawing/2014/main" id="{E0A37FAF-D0EC-85D7-C436-5FC2269AB428}"/>
+              </a:ext>
+            </a:extLst>
+          </p:cNvPr>
+          <p:cNvPicPr>
+            <a:picLocks noChangeAspect="1"/>
+          </p:cNvPicPr>
+          <p:nvPr/>
+        </p:nvPicPr>
+        <p:blipFill>
+          <a:blip r:embed="rId11">
+            <a:extLst>
+              <a:ext uri="{28A0092B-C50C-407E-A947-70E740481C1C}">
+                <a14:useLocalDpi xmlns:a14="http://schemas.microsoft.com/office/drawing/2010/main" val="0"/>
+              </a:ext>
+            </a:extLst>
+          </a:blip>
+          <a:stretch>
+            <a:fillRect/>
+          </a:stretch>
+        </p:blipFill>
+        <p:spPr>
+          <a:xfrm>
+            <a:off x="3858738" y="3107150"/>
+            <a:ext cx="291033" cy="291033"/>
+          </a:xfrm>
+          <a:prstGeom prst="rect">
+            <a:avLst/>
+          </a:prstGeom>
+        </p:spPr>
+      </p:pic>
+    </p:spTree>
+    <p:extLst>
+      <p:ext uri="{BB962C8B-B14F-4D97-AF65-F5344CB8AC3E}">
+        <p14:creationId xmlns:p14="http://schemas.microsoft.com/office/powerpoint/2010/main" val="2346812855"/>
       </p:ext>
     </p:extLst>
   </p:cSld>

</xml_diff>